<commit_message>
qa and fixes to build issues
</commit_message>
<xml_diff>
--- a/source/pages/assets/images/source/framework_stepdiagrams.pptx
+++ b/source/pages/assets/images/source/framework_stepdiagrams.pptx
@@ -6,6 +6,7 @@
   </p:sldMasterIdLst>
   <p:sldIdLst>
     <p:sldId id="256" r:id="rId2"/>
+    <p:sldId id="257" r:id="rId3"/>
   </p:sldIdLst>
   <p:sldSz cx="12192000" cy="6858000"/>
   <p:notesSz cx="6858000" cy="9144000"/>
@@ -259,7 +260,7 @@
           <a:p>
             <a:fld id="{5076178A-790B-0849-A0B8-42D827F2F471}" type="datetimeFigureOut">
               <a:rPr lang="en-US" smtClean="0"/>
-              <a:t>6/14/20</a:t>
+              <a:t>6/17/20</a:t>
             </a:fld>
             <a:endParaRPr lang="en-US"/>
           </a:p>
@@ -457,7 +458,7 @@
           <a:p>
             <a:fld id="{5076178A-790B-0849-A0B8-42D827F2F471}" type="datetimeFigureOut">
               <a:rPr lang="en-US" smtClean="0"/>
-              <a:t>6/14/20</a:t>
+              <a:t>6/17/20</a:t>
             </a:fld>
             <a:endParaRPr lang="en-US"/>
           </a:p>
@@ -665,7 +666,7 @@
           <a:p>
             <a:fld id="{5076178A-790B-0849-A0B8-42D827F2F471}" type="datetimeFigureOut">
               <a:rPr lang="en-US" smtClean="0"/>
-              <a:t>6/14/20</a:t>
+              <a:t>6/17/20</a:t>
             </a:fld>
             <a:endParaRPr lang="en-US"/>
           </a:p>
@@ -863,7 +864,7 @@
           <a:p>
             <a:fld id="{5076178A-790B-0849-A0B8-42D827F2F471}" type="datetimeFigureOut">
               <a:rPr lang="en-US" smtClean="0"/>
-              <a:t>6/14/20</a:t>
+              <a:t>6/17/20</a:t>
             </a:fld>
             <a:endParaRPr lang="en-US"/>
           </a:p>
@@ -1138,7 +1139,7 @@
           <a:p>
             <a:fld id="{5076178A-790B-0849-A0B8-42D827F2F471}" type="datetimeFigureOut">
               <a:rPr lang="en-US" smtClean="0"/>
-              <a:t>6/14/20</a:t>
+              <a:t>6/17/20</a:t>
             </a:fld>
             <a:endParaRPr lang="en-US"/>
           </a:p>
@@ -1403,7 +1404,7 @@
           <a:p>
             <a:fld id="{5076178A-790B-0849-A0B8-42D827F2F471}" type="datetimeFigureOut">
               <a:rPr lang="en-US" smtClean="0"/>
-              <a:t>6/14/20</a:t>
+              <a:t>6/17/20</a:t>
             </a:fld>
             <a:endParaRPr lang="en-US"/>
           </a:p>
@@ -1815,7 +1816,7 @@
           <a:p>
             <a:fld id="{5076178A-790B-0849-A0B8-42D827F2F471}" type="datetimeFigureOut">
               <a:rPr lang="en-US" smtClean="0"/>
-              <a:t>6/14/20</a:t>
+              <a:t>6/17/20</a:t>
             </a:fld>
             <a:endParaRPr lang="en-US"/>
           </a:p>
@@ -1956,7 +1957,7 @@
           <a:p>
             <a:fld id="{5076178A-790B-0849-A0B8-42D827F2F471}" type="datetimeFigureOut">
               <a:rPr lang="en-US" smtClean="0"/>
-              <a:t>6/14/20</a:t>
+              <a:t>6/17/20</a:t>
             </a:fld>
             <a:endParaRPr lang="en-US"/>
           </a:p>
@@ -2069,7 +2070,7 @@
           <a:p>
             <a:fld id="{5076178A-790B-0849-A0B8-42D827F2F471}" type="datetimeFigureOut">
               <a:rPr lang="en-US" smtClean="0"/>
-              <a:t>6/14/20</a:t>
+              <a:t>6/17/20</a:t>
             </a:fld>
             <a:endParaRPr lang="en-US"/>
           </a:p>
@@ -2380,7 +2381,7 @@
           <a:p>
             <a:fld id="{5076178A-790B-0849-A0B8-42D827F2F471}" type="datetimeFigureOut">
               <a:rPr lang="en-US" smtClean="0"/>
-              <a:t>6/14/20</a:t>
+              <a:t>6/17/20</a:t>
             </a:fld>
             <a:endParaRPr lang="en-US"/>
           </a:p>
@@ -2668,7 +2669,7 @@
           <a:p>
             <a:fld id="{5076178A-790B-0849-A0B8-42D827F2F471}" type="datetimeFigureOut">
               <a:rPr lang="en-US" smtClean="0"/>
-              <a:t>6/14/20</a:t>
+              <a:t>6/17/20</a:t>
             </a:fld>
             <a:endParaRPr lang="en-US"/>
           </a:p>
@@ -2909,7 +2910,7 @@
           <a:p>
             <a:fld id="{5076178A-790B-0849-A0B8-42D827F2F471}" type="datetimeFigureOut">
               <a:rPr lang="en-US" smtClean="0"/>
-              <a:t>6/14/20</a:t>
+              <a:t>6/17/20</a:t>
             </a:fld>
             <a:endParaRPr lang="en-US"/>
           </a:p>
@@ -3631,6 +3632,434 @@
 </p:sld>
 </file>
 
+<file path=ppt/slides/slide2.xml><?xml version="1.0" encoding="utf-8"?>
+<p:sld xmlns:a="http://schemas.openxmlformats.org/drawingml/2006/main" xmlns:r="http://schemas.openxmlformats.org/officeDocument/2006/relationships" xmlns:p="http://schemas.openxmlformats.org/presentationml/2006/main">
+  <p:cSld>
+    <p:spTree>
+      <p:nvGrpSpPr>
+        <p:cNvPr id="1" name=""/>
+        <p:cNvGrpSpPr/>
+        <p:nvPr/>
+      </p:nvGrpSpPr>
+      <p:grpSpPr>
+        <a:xfrm>
+          <a:off x="0" y="0"/>
+          <a:ext cx="0" cy="0"/>
+          <a:chOff x="0" y="0"/>
+          <a:chExt cx="0" cy="0"/>
+        </a:xfrm>
+      </p:grpSpPr>
+      <p:sp>
+        <p:nvSpPr>
+          <p:cNvPr id="2" name="Curved Left Arrow 1">
+            <a:extLst>
+              <a:ext uri="{FF2B5EF4-FFF2-40B4-BE49-F238E27FC236}">
+                <a16:creationId xmlns:a16="http://schemas.microsoft.com/office/drawing/2014/main" id="{D6823A07-9D4E-934F-BE9C-C5082391264B}"/>
+              </a:ext>
+            </a:extLst>
+          </p:cNvPr>
+          <p:cNvSpPr/>
+          <p:nvPr/>
+        </p:nvSpPr>
+        <p:spPr>
+          <a:xfrm>
+            <a:off x="6215723" y="4152439"/>
+            <a:ext cx="1117600" cy="691851"/>
+          </a:xfrm>
+          <a:prstGeom prst="curvedLeftArrow">
+            <a:avLst/>
+          </a:prstGeom>
+          <a:solidFill>
+            <a:schemeClr val="bg2"/>
+          </a:solidFill>
+        </p:spPr>
+        <p:style>
+          <a:lnRef idx="1">
+            <a:schemeClr val="accent3"/>
+          </a:lnRef>
+          <a:fillRef idx="2">
+            <a:schemeClr val="accent3"/>
+          </a:fillRef>
+          <a:effectRef idx="1">
+            <a:schemeClr val="accent3"/>
+          </a:effectRef>
+          <a:fontRef idx="minor">
+            <a:schemeClr val="dk1"/>
+          </a:fontRef>
+        </p:style>
+        <p:txBody>
+          <a:bodyPr rtlCol="0" anchor="ctr"/>
+          <a:lstStyle/>
+          <a:p>
+            <a:pPr algn="ctr"/>
+            <a:endParaRPr lang="en-US">
+              <a:solidFill>
+                <a:schemeClr val="tx1"/>
+              </a:solidFill>
+            </a:endParaRPr>
+          </a:p>
+        </p:txBody>
+      </p:sp>
+      <p:sp>
+        <p:nvSpPr>
+          <p:cNvPr id="3" name="TextBox 2">
+            <a:extLst>
+              <a:ext uri="{FF2B5EF4-FFF2-40B4-BE49-F238E27FC236}">
+                <a16:creationId xmlns:a16="http://schemas.microsoft.com/office/drawing/2014/main" id="{D523D505-28CE-6B4B-B23B-71A4DEABB829}"/>
+              </a:ext>
+            </a:extLst>
+          </p:cNvPr>
+          <p:cNvSpPr txBox="1"/>
+          <p:nvPr/>
+        </p:nvSpPr>
+        <p:spPr>
+          <a:xfrm>
+            <a:off x="7505700" y="4036699"/>
+            <a:ext cx="2631185" cy="923330"/>
+          </a:xfrm>
+          <a:prstGeom prst="rect">
+            <a:avLst/>
+          </a:prstGeom>
+          <a:noFill/>
+        </p:spPr>
+        <p:txBody>
+          <a:bodyPr wrap="square" rtlCol="0">
+            <a:spAutoFit/>
+          </a:bodyPr>
+          <a:lstStyle/>
+          <a:p>
+            <a:r>
+              <a:rPr lang="en-US" dirty="0"/>
+              <a:t>Snapshot or Incremental Updates during submission period</a:t>
+            </a:r>
+          </a:p>
+        </p:txBody>
+      </p:sp>
+      <p:sp>
+        <p:nvSpPr>
+          <p:cNvPr id="4" name="Rounded Rectangle 3">
+            <a:extLst>
+              <a:ext uri="{FF2B5EF4-FFF2-40B4-BE49-F238E27FC236}">
+                <a16:creationId xmlns:a16="http://schemas.microsoft.com/office/drawing/2014/main" id="{CE57DA2F-7B87-6241-9180-824AA1F42E13}"/>
+              </a:ext>
+            </a:extLst>
+          </p:cNvPr>
+          <p:cNvSpPr/>
+          <p:nvPr/>
+        </p:nvSpPr>
+        <p:spPr>
+          <a:xfrm>
+            <a:off x="3850606" y="2007330"/>
+            <a:ext cx="2192740" cy="1255594"/>
+          </a:xfrm>
+          <a:prstGeom prst="roundRect">
+            <a:avLst/>
+          </a:prstGeom>
+          <a:solidFill>
+            <a:schemeClr val="accent5"/>
+          </a:solidFill>
+        </p:spPr>
+        <p:style>
+          <a:lnRef idx="2">
+            <a:schemeClr val="accent1">
+              <a:shade val="50000"/>
+            </a:schemeClr>
+          </a:lnRef>
+          <a:fillRef idx="1">
+            <a:schemeClr val="accent1"/>
+          </a:fillRef>
+          <a:effectRef idx="0">
+            <a:schemeClr val="accent1"/>
+          </a:effectRef>
+          <a:fontRef idx="minor">
+            <a:schemeClr val="lt1"/>
+          </a:fontRef>
+        </p:style>
+        <p:txBody>
+          <a:bodyPr rtlCol="0" anchor="ctr"/>
+          <a:lstStyle/>
+          <a:p>
+            <a:pPr marL="342900" indent="-342900" algn="ctr">
+              <a:buAutoNum type="arabicPeriod"/>
+            </a:pPr>
+            <a:r>
+              <a:rPr lang="en-US" dirty="0"/>
+              <a:t>Get Data Requirements</a:t>
+            </a:r>
+          </a:p>
+          <a:p>
+            <a:pPr algn="ctr"/>
+            <a:r>
+              <a:rPr lang="en-US" dirty="0"/>
+              <a:t>(optional)</a:t>
+            </a:r>
+          </a:p>
+        </p:txBody>
+      </p:sp>
+      <p:cxnSp>
+        <p:nvCxnSpPr>
+          <p:cNvPr id="6" name="Straight Arrow Connector 5">
+            <a:extLst>
+              <a:ext uri="{FF2B5EF4-FFF2-40B4-BE49-F238E27FC236}">
+                <a16:creationId xmlns:a16="http://schemas.microsoft.com/office/drawing/2014/main" id="{90340862-6B0D-134E-9D1B-757EC8C50EF1}"/>
+              </a:ext>
+            </a:extLst>
+          </p:cNvPr>
+          <p:cNvCxnSpPr>
+            <a:cxnSpLocks/>
+          </p:cNvCxnSpPr>
+          <p:nvPr/>
+        </p:nvCxnSpPr>
+        <p:spPr>
+          <a:xfrm flipH="1">
+            <a:off x="4943231" y="3281674"/>
+            <a:ext cx="7491" cy="570144"/>
+          </a:xfrm>
+          <a:prstGeom prst="straightConnector1">
+            <a:avLst/>
+          </a:prstGeom>
+          <a:ln w="38100">
+            <a:tailEnd type="triangle"/>
+          </a:ln>
+        </p:spPr>
+        <p:style>
+          <a:lnRef idx="1">
+            <a:schemeClr val="dk1"/>
+          </a:lnRef>
+          <a:fillRef idx="0">
+            <a:schemeClr val="dk1"/>
+          </a:fillRef>
+          <a:effectRef idx="0">
+            <a:schemeClr val="dk1"/>
+          </a:effectRef>
+          <a:fontRef idx="minor">
+            <a:schemeClr val="tx1"/>
+          </a:fontRef>
+        </p:style>
+      </p:cxnSp>
+      <p:cxnSp>
+        <p:nvCxnSpPr>
+          <p:cNvPr id="8" name="Straight Arrow Connector 7">
+            <a:extLst>
+              <a:ext uri="{FF2B5EF4-FFF2-40B4-BE49-F238E27FC236}">
+                <a16:creationId xmlns:a16="http://schemas.microsoft.com/office/drawing/2014/main" id="{B8C10A8C-F229-E84C-8A26-98F91A10AA88}"/>
+              </a:ext>
+            </a:extLst>
+          </p:cNvPr>
+          <p:cNvCxnSpPr>
+            <a:cxnSpLocks/>
+            <a:stCxn id="11" idx="2"/>
+          </p:cNvCxnSpPr>
+          <p:nvPr/>
+        </p:nvCxnSpPr>
+        <p:spPr>
+          <a:xfrm flipH="1">
+            <a:off x="4936016" y="1357638"/>
+            <a:ext cx="10960" cy="630942"/>
+          </a:xfrm>
+          <a:prstGeom prst="straightConnector1">
+            <a:avLst/>
+          </a:prstGeom>
+          <a:ln w="38100">
+            <a:tailEnd type="triangle"/>
+          </a:ln>
+        </p:spPr>
+        <p:style>
+          <a:lnRef idx="1">
+            <a:schemeClr val="dk1"/>
+          </a:lnRef>
+          <a:fillRef idx="0">
+            <a:schemeClr val="dk1"/>
+          </a:fillRef>
+          <a:effectRef idx="0">
+            <a:schemeClr val="dk1"/>
+          </a:effectRef>
+          <a:fontRef idx="minor">
+            <a:schemeClr val="tx1"/>
+          </a:fontRef>
+        </p:style>
+      </p:cxnSp>
+      <p:sp>
+        <p:nvSpPr>
+          <p:cNvPr id="11" name="TextBox 10">
+            <a:extLst>
+              <a:ext uri="{FF2B5EF4-FFF2-40B4-BE49-F238E27FC236}">
+                <a16:creationId xmlns:a16="http://schemas.microsoft.com/office/drawing/2014/main" id="{3644CAEE-A9AE-524B-AFD3-0A5C19ECC0E2}"/>
+              </a:ext>
+            </a:extLst>
+          </p:cNvPr>
+          <p:cNvSpPr txBox="1"/>
+          <p:nvPr/>
+        </p:nvSpPr>
+        <p:spPr>
+          <a:xfrm>
+            <a:off x="4212685" y="988306"/>
+            <a:ext cx="1468582" cy="369332"/>
+          </a:xfrm>
+          <a:prstGeom prst="rect">
+            <a:avLst/>
+          </a:prstGeom>
+          <a:noFill/>
+        </p:spPr>
+        <p:txBody>
+          <a:bodyPr wrap="square" rtlCol="0">
+            <a:spAutoFit/>
+          </a:bodyPr>
+          <a:lstStyle/>
+          <a:p>
+            <a:pPr algn="ctr"/>
+            <a:r>
+              <a:rPr lang="en-US" dirty="0"/>
+              <a:t>Start</a:t>
+            </a:r>
+          </a:p>
+        </p:txBody>
+      </p:sp>
+      <p:sp>
+        <p:nvSpPr>
+          <p:cNvPr id="13" name="TextBox 12">
+            <a:extLst>
+              <a:ext uri="{FF2B5EF4-FFF2-40B4-BE49-F238E27FC236}">
+                <a16:creationId xmlns:a16="http://schemas.microsoft.com/office/drawing/2014/main" id="{F7CE8C12-30D6-7146-87ED-1298C0553CF7}"/>
+              </a:ext>
+            </a:extLst>
+          </p:cNvPr>
+          <p:cNvSpPr txBox="1"/>
+          <p:nvPr/>
+        </p:nvSpPr>
+        <p:spPr>
+          <a:xfrm>
+            <a:off x="4212685" y="5869694"/>
+            <a:ext cx="1468582" cy="369332"/>
+          </a:xfrm>
+          <a:prstGeom prst="rect">
+            <a:avLst/>
+          </a:prstGeom>
+          <a:noFill/>
+        </p:spPr>
+        <p:txBody>
+          <a:bodyPr wrap="square" rtlCol="0">
+            <a:spAutoFit/>
+          </a:bodyPr>
+          <a:lstStyle/>
+          <a:p>
+            <a:pPr algn="ctr"/>
+            <a:r>
+              <a:rPr lang="en-US" dirty="0"/>
+              <a:t>End</a:t>
+            </a:r>
+          </a:p>
+        </p:txBody>
+      </p:sp>
+      <p:sp>
+        <p:nvSpPr>
+          <p:cNvPr id="9" name="Rounded Rectangle 8">
+            <a:extLst>
+              <a:ext uri="{FF2B5EF4-FFF2-40B4-BE49-F238E27FC236}">
+                <a16:creationId xmlns:a16="http://schemas.microsoft.com/office/drawing/2014/main" id="{3B7191B8-B5C5-2C4D-BBBE-83FF3252F082}"/>
+              </a:ext>
+            </a:extLst>
+          </p:cNvPr>
+          <p:cNvSpPr/>
+          <p:nvPr/>
+        </p:nvSpPr>
+        <p:spPr>
+          <a:xfrm>
+            <a:off x="3850606" y="3870568"/>
+            <a:ext cx="2192740" cy="1255594"/>
+          </a:xfrm>
+          <a:prstGeom prst="roundRect">
+            <a:avLst/>
+          </a:prstGeom>
+          <a:solidFill>
+            <a:schemeClr val="accent5"/>
+          </a:solidFill>
+        </p:spPr>
+        <p:style>
+          <a:lnRef idx="2">
+            <a:schemeClr val="accent1">
+              <a:shade val="50000"/>
+            </a:schemeClr>
+          </a:lnRef>
+          <a:fillRef idx="1">
+            <a:schemeClr val="accent1"/>
+          </a:fillRef>
+          <a:effectRef idx="0">
+            <a:schemeClr val="accent1"/>
+          </a:effectRef>
+          <a:fontRef idx="minor">
+            <a:schemeClr val="lt1"/>
+          </a:fontRef>
+        </p:style>
+        <p:txBody>
+          <a:bodyPr rtlCol="0" anchor="ctr"/>
+          <a:lstStyle/>
+          <a:p>
+            <a:pPr marL="342900" indent="-342900" algn="ctr">
+              <a:buFont typeface="+mj-lt"/>
+              <a:buAutoNum type="arabicPeriod" startAt="2"/>
+            </a:pPr>
+            <a:r>
+              <a:rPr lang="en-US" dirty="0"/>
+              <a:t>Submit Data</a:t>
+            </a:r>
+          </a:p>
+        </p:txBody>
+      </p:sp>
+      <p:cxnSp>
+        <p:nvCxnSpPr>
+          <p:cNvPr id="12" name="Straight Arrow Connector 11">
+            <a:extLst>
+              <a:ext uri="{FF2B5EF4-FFF2-40B4-BE49-F238E27FC236}">
+                <a16:creationId xmlns:a16="http://schemas.microsoft.com/office/drawing/2014/main" id="{78F9713D-2766-894E-8FE7-4E71A36F4277}"/>
+              </a:ext>
+            </a:extLst>
+          </p:cNvPr>
+          <p:cNvCxnSpPr>
+            <a:cxnSpLocks/>
+          </p:cNvCxnSpPr>
+          <p:nvPr/>
+        </p:nvCxnSpPr>
+        <p:spPr>
+          <a:xfrm>
+            <a:off x="4946976" y="5144912"/>
+            <a:ext cx="1" cy="706035"/>
+          </a:xfrm>
+          <a:prstGeom prst="straightConnector1">
+            <a:avLst/>
+          </a:prstGeom>
+          <a:ln w="38100">
+            <a:tailEnd type="triangle"/>
+          </a:ln>
+        </p:spPr>
+        <p:style>
+          <a:lnRef idx="1">
+            <a:schemeClr val="dk1"/>
+          </a:lnRef>
+          <a:fillRef idx="0">
+            <a:schemeClr val="dk1"/>
+          </a:fillRef>
+          <a:effectRef idx="0">
+            <a:schemeClr val="dk1"/>
+          </a:effectRef>
+          <a:fontRef idx="minor">
+            <a:schemeClr val="tx1"/>
+          </a:fontRef>
+        </p:style>
+      </p:cxnSp>
+    </p:spTree>
+    <p:extLst>
+      <p:ext uri="{BB962C8B-B14F-4D97-AF65-F5344CB8AC3E}">
+        <p14:creationId xmlns:p14="http://schemas.microsoft.com/office/powerpoint/2010/main" val="1112315184"/>
+      </p:ext>
+    </p:extLst>
+  </p:cSld>
+  <p:clrMapOvr>
+    <a:masterClrMapping/>
+  </p:clrMapOvr>
+</p:sld>
+</file>
+
 <file path=ppt/theme/theme1.xml><?xml version="1.0" encoding="utf-8"?>
 <a:theme xmlns:a="http://schemas.openxmlformats.org/drawingml/2006/main" name="Office Theme">
   <a:themeElements>

</xml_diff>